<commit_message>
Added regex and beans
</commit_message>
<xml_diff>
--- a/advanced-java/Slides/Advanced Java.pptx
+++ b/advanced-java/Slides/Advanced Java.pptx
@@ -14,6 +14,8 @@
     <p:sldId id="262" r:id="rId8"/>
     <p:sldId id="263" r:id="rId9"/>
     <p:sldId id="264" r:id="rId10"/>
+    <p:sldId id="265" r:id="rId11"/>
+    <p:sldId id="266" r:id="rId12"/>
   </p:sldIdLst>
   <p:sldSz cx="12192000" cy="6858000"/>
   <p:notesSz cx="6858000" cy="9144000"/>
@@ -3877,6 +3879,261 @@
 </p:sld>
 </file>
 
+<file path=ppt/slides/slide10.xml><?xml version="1.0" encoding="utf-8"?>
+<p:sld xmlns:a="http://schemas.openxmlformats.org/drawingml/2006/main" xmlns:r="http://schemas.openxmlformats.org/officeDocument/2006/relationships" xmlns:p="http://schemas.openxmlformats.org/presentationml/2006/main">
+  <p:cSld>
+    <p:spTree>
+      <p:nvGrpSpPr>
+        <p:cNvPr id="1" name=""/>
+        <p:cNvGrpSpPr/>
+        <p:nvPr/>
+      </p:nvGrpSpPr>
+      <p:grpSpPr>
+        <a:xfrm>
+          <a:off x="0" y="0"/>
+          <a:ext cx="0" cy="0"/>
+          <a:chOff x="0" y="0"/>
+          <a:chExt cx="0" cy="0"/>
+        </a:xfrm>
+      </p:grpSpPr>
+      <p:sp>
+        <p:nvSpPr>
+          <p:cNvPr id="2" name="Title 1">
+            <a:extLst>
+              <a:ext uri="{FF2B5EF4-FFF2-40B4-BE49-F238E27FC236}">
+                <a16:creationId xmlns:a16="http://schemas.microsoft.com/office/drawing/2014/main" id="{43376E53-1A47-C18D-8F68-107EC22190E4}"/>
+              </a:ext>
+            </a:extLst>
+          </p:cNvPr>
+          <p:cNvSpPr>
+            <a:spLocks noGrp="1"/>
+          </p:cNvSpPr>
+          <p:nvPr>
+            <p:ph type="title"/>
+          </p:nvPr>
+        </p:nvSpPr>
+        <p:spPr/>
+        <p:txBody>
+          <a:bodyPr/>
+          <a:lstStyle/>
+          <a:p>
+            <a:r>
+              <a:rPr lang="en-US" dirty="0"/>
+              <a:t>Java Beans</a:t>
+            </a:r>
+          </a:p>
+        </p:txBody>
+      </p:sp>
+      <p:sp>
+        <p:nvSpPr>
+          <p:cNvPr id="3" name="Content Placeholder 2">
+            <a:extLst>
+              <a:ext uri="{FF2B5EF4-FFF2-40B4-BE49-F238E27FC236}">
+                <a16:creationId xmlns:a16="http://schemas.microsoft.com/office/drawing/2014/main" id="{98C80A11-A47E-2B2F-1B4A-B44BA01CBD1C}"/>
+              </a:ext>
+            </a:extLst>
+          </p:cNvPr>
+          <p:cNvSpPr>
+            <a:spLocks noGrp="1"/>
+          </p:cNvSpPr>
+          <p:nvPr>
+            <p:ph idx="1"/>
+          </p:nvPr>
+        </p:nvSpPr>
+        <p:spPr/>
+        <p:txBody>
+          <a:bodyPr/>
+          <a:lstStyle/>
+          <a:p>
+            <a:r>
+              <a:rPr lang="en-US" dirty="0"/>
+              <a:t>The beans of JavaBeans are classes that encapsulate one or more objects into a single standardized object.</a:t>
+            </a:r>
+          </a:p>
+          <a:p>
+            <a:r>
+              <a:rPr lang="en-US" dirty="0"/>
+              <a:t>It is a reusable software component and can be manipulated visually in a builder tool (any IDE)..</a:t>
+            </a:r>
+          </a:p>
+          <a:p>
+            <a:r>
+              <a:rPr lang="en-US" dirty="0"/>
+              <a:t>Properties:</a:t>
+            </a:r>
+          </a:p>
+          <a:p>
+            <a:pPr lvl="1"/>
+            <a:r>
+              <a:rPr lang="en-US" dirty="0"/>
+              <a:t>Should have a no-</a:t>
+            </a:r>
+            <a:r>
+              <a:rPr lang="en-US" dirty="0" err="1"/>
+              <a:t>args</a:t>
+            </a:r>
+            <a:r>
+              <a:rPr lang="en-US" dirty="0"/>
+              <a:t> constructor</a:t>
+            </a:r>
+          </a:p>
+          <a:p>
+            <a:pPr lvl="1"/>
+            <a:r>
+              <a:rPr lang="en-US" dirty="0"/>
+              <a:t>Have getters and setters, private properties</a:t>
+            </a:r>
+          </a:p>
+          <a:p>
+            <a:pPr lvl="1"/>
+            <a:r>
+              <a:rPr lang="en-US" dirty="0"/>
+              <a:t>Must be serializable</a:t>
+            </a:r>
+          </a:p>
+        </p:txBody>
+      </p:sp>
+    </p:spTree>
+    <p:extLst>
+      <p:ext uri="{BB962C8B-B14F-4D97-AF65-F5344CB8AC3E}">
+        <p14:creationId xmlns:p14="http://schemas.microsoft.com/office/powerpoint/2010/main" val="1023696093"/>
+      </p:ext>
+    </p:extLst>
+  </p:cSld>
+  <p:clrMapOvr>
+    <a:masterClrMapping/>
+  </p:clrMapOvr>
+</p:sld>
+</file>
+
+<file path=ppt/slides/slide11.xml><?xml version="1.0" encoding="utf-8"?>
+<p:sld xmlns:a="http://schemas.openxmlformats.org/drawingml/2006/main" xmlns:r="http://schemas.openxmlformats.org/officeDocument/2006/relationships" xmlns:p="http://schemas.openxmlformats.org/presentationml/2006/main">
+  <p:cSld>
+    <p:spTree>
+      <p:nvGrpSpPr>
+        <p:cNvPr id="1" name=""/>
+        <p:cNvGrpSpPr/>
+        <p:nvPr/>
+      </p:nvGrpSpPr>
+      <p:grpSpPr>
+        <a:xfrm>
+          <a:off x="0" y="0"/>
+          <a:ext cx="0" cy="0"/>
+          <a:chOff x="0" y="0"/>
+          <a:chExt cx="0" cy="0"/>
+        </a:xfrm>
+      </p:grpSpPr>
+      <p:sp>
+        <p:nvSpPr>
+          <p:cNvPr id="2" name="Title 1">
+            <a:extLst>
+              <a:ext uri="{FF2B5EF4-FFF2-40B4-BE49-F238E27FC236}">
+                <a16:creationId xmlns:a16="http://schemas.microsoft.com/office/drawing/2014/main" id="{3CA6801C-AF01-5819-0790-169D4E3B9694}"/>
+              </a:ext>
+            </a:extLst>
+          </p:cNvPr>
+          <p:cNvSpPr>
+            <a:spLocks noGrp="1"/>
+          </p:cNvSpPr>
+          <p:nvPr>
+            <p:ph type="title"/>
+          </p:nvPr>
+        </p:nvSpPr>
+        <p:spPr/>
+        <p:txBody>
+          <a:bodyPr/>
+          <a:lstStyle/>
+          <a:p>
+            <a:r>
+              <a:rPr lang="en-US" dirty="0"/>
+              <a:t>JSP and Servlet</a:t>
+            </a:r>
+          </a:p>
+        </p:txBody>
+      </p:sp>
+      <p:sp>
+        <p:nvSpPr>
+          <p:cNvPr id="3" name="Content Placeholder 2">
+            <a:extLst>
+              <a:ext uri="{FF2B5EF4-FFF2-40B4-BE49-F238E27FC236}">
+                <a16:creationId xmlns:a16="http://schemas.microsoft.com/office/drawing/2014/main" id="{C68C92ED-598E-3FF0-82BE-99B4B4449198}"/>
+              </a:ext>
+            </a:extLst>
+          </p:cNvPr>
+          <p:cNvSpPr>
+            <a:spLocks noGrp="1"/>
+          </p:cNvSpPr>
+          <p:nvPr>
+            <p:ph idx="1"/>
+          </p:nvPr>
+        </p:nvSpPr>
+        <p:spPr/>
+        <p:txBody>
+          <a:bodyPr/>
+          <a:lstStyle/>
+          <a:p>
+            <a:r>
+              <a:rPr lang="en-US" dirty="0"/>
+              <a:t>Client requests server for information and Server (Tomcat,  </a:t>
+            </a:r>
+            <a:r>
+              <a:rPr lang="en-US" dirty="0" err="1"/>
+              <a:t>Jboss</a:t>
+            </a:r>
+            <a:r>
+              <a:rPr lang="en-US" dirty="0"/>
+              <a:t>, </a:t>
+            </a:r>
+            <a:r>
+              <a:rPr lang="en-US" dirty="0" err="1"/>
+              <a:t>GlassFish</a:t>
+            </a:r>
+            <a:r>
+              <a:rPr lang="en-US" dirty="0"/>
+              <a:t>) accesses the Web container in an application to process the request and provide response to the client.</a:t>
+            </a:r>
+          </a:p>
+          <a:p>
+            <a:r>
+              <a:rPr lang="en-US" dirty="0"/>
+              <a:t>Deployment descriptor: web.xml </a:t>
+            </a:r>
+            <a:r>
+              <a:rPr lang="en-US" dirty="0">
+                <a:sym typeface="Wingdings" panose="05000000000000000000" pitchFamily="2" charset="2"/>
+              </a:rPr>
+              <a:t> Which request should call </a:t>
+            </a:r>
+            <a:r>
+              <a:rPr lang="en-US">
+                <a:sym typeface="Wingdings" panose="05000000000000000000" pitchFamily="2" charset="2"/>
+              </a:rPr>
+              <a:t>which method</a:t>
+            </a:r>
+            <a:endParaRPr lang="en-US" dirty="0"/>
+          </a:p>
+          <a:p>
+            <a:pPr lvl="1"/>
+            <a:r>
+              <a:rPr lang="en-US" dirty="0"/>
+              <a:t>This contains servlets and servlet mappings</a:t>
+            </a:r>
+          </a:p>
+        </p:txBody>
+      </p:sp>
+    </p:spTree>
+    <p:extLst>
+      <p:ext uri="{BB962C8B-B14F-4D97-AF65-F5344CB8AC3E}">
+        <p14:creationId xmlns:p14="http://schemas.microsoft.com/office/powerpoint/2010/main" val="2396375790"/>
+      </p:ext>
+    </p:extLst>
+  </p:cSld>
+  <p:clrMapOvr>
+    <a:masterClrMapping/>
+  </p:clrMapOvr>
+</p:sld>
+</file>
+
 <file path=ppt/slides/slide2.xml><?xml version="1.0" encoding="utf-8"?>
 <p:sld xmlns:a="http://schemas.openxmlformats.org/drawingml/2006/main" xmlns:r="http://schemas.openxmlformats.org/officeDocument/2006/relationships" xmlns:p="http://schemas.openxmlformats.org/presentationml/2006/main">
   <p:cSld>

</xml_diff>